<commit_message>
Univariate plots foe demog vars
</commit_message>
<xml_diff>
--- a/STEM Grad Students.pptx
+++ b/STEM Grad Students.pptx
@@ -717,7 +717,7 @@
           <a:bodyPr/>
           <a:lstStyle/>
           <a:p>
-            <a:endParaRPr lang="en-US"/>
+            <a:endParaRPr lang="en-US" dirty="0"/>
           </a:p>
         </p:txBody>
       </p:sp>
@@ -1053,7 +1053,37 @@
           <a:bodyPr/>
           <a:lstStyle/>
           <a:p>
-            <a:endParaRPr lang="en-US"/>
+            <a:r>
+              <a:rPr lang="en-US" dirty="0"/>
+              <a:t>13 NA’s in gender</a:t>
+            </a:r>
+          </a:p>
+          <a:p>
+            <a:r>
+              <a:rPr lang="en-US" dirty="0"/>
+              <a:t>Country plot – 3</a:t>
+            </a:r>
+            <a:r>
+              <a:rPr lang="en-US" baseline="30000" dirty="0"/>
+              <a:t>rd</a:t>
+            </a:r>
+            <a:r>
+              <a:rPr lang="en-US" dirty="0"/>
+              <a:t>  </a:t>
+            </a:r>
+            <a:r>
+              <a:rPr lang="en-US"/>
+              <a:t>highest (after India) is </a:t>
+            </a:r>
+            <a:r>
+              <a:rPr lang="en-US" dirty="0"/>
+              <a:t>less </a:t>
+            </a:r>
+            <a:r>
+              <a:rPr lang="en-US"/>
+              <a:t>than 30</a:t>
+            </a:r>
+            <a:endParaRPr lang="en-US" dirty="0"/>
           </a:p>
         </p:txBody>
       </p:sp>
@@ -1902,45 +1932,6 @@
           </a:p>
         </p:txBody>
       </p:sp>
-      <p:sp>
-        <p:nvSpPr>
-          <p:cNvPr id="9" name="TextBox 8">
-            <a:extLst>
-              <a:ext uri="{FF2B5EF4-FFF2-40B4-BE49-F238E27FC236}">
-                <a16:creationId xmlns:a16="http://schemas.microsoft.com/office/drawing/2014/main" id="{F0677F9C-777B-824B-9447-11C653DBCC4F}"/>
-              </a:ext>
-            </a:extLst>
-          </p:cNvPr>
-          <p:cNvSpPr txBox="1"/>
-          <p:nvPr userDrawn="1"/>
-        </p:nvSpPr>
-        <p:spPr>
-          <a:xfrm>
-            <a:off x="249459" y="4730098"/>
-            <a:ext cx="3613600" cy="230832"/>
-          </a:xfrm>
-          <a:prstGeom prst="rect">
-            <a:avLst/>
-          </a:prstGeom>
-          <a:noFill/>
-        </p:spPr>
-        <p:txBody>
-          <a:bodyPr wrap="square" rtlCol="0" anchor="ctr">
-            <a:spAutoFit/>
-          </a:bodyPr>
-          <a:lstStyle/>
-          <a:p>
-            <a:r>
-              <a:rPr lang="en-US" sz="900" dirty="0">
-                <a:solidFill>
-                  <a:schemeClr val="bg1"/>
-                </a:solidFill>
-              </a:rPr>
-              <a:t>INDIANA UNIVERSITY BLOOMINGTON</a:t>
-            </a:r>
-          </a:p>
-        </p:txBody>
-      </p:sp>
       <p:pic>
         <p:nvPicPr>
           <p:cNvPr id="13" name="Picture 12">
@@ -2214,45 +2205,6 @@
           </a:p>
         </p:txBody>
       </p:sp>
-      <p:sp>
-        <p:nvSpPr>
-          <p:cNvPr id="11" name="TextBox 10">
-            <a:extLst>
-              <a:ext uri="{FF2B5EF4-FFF2-40B4-BE49-F238E27FC236}">
-                <a16:creationId xmlns:a16="http://schemas.microsoft.com/office/drawing/2014/main" id="{41DDCA7A-03B7-A742-942F-BEBFB05EA3CE}"/>
-              </a:ext>
-            </a:extLst>
-          </p:cNvPr>
-          <p:cNvSpPr txBox="1"/>
-          <p:nvPr userDrawn="1"/>
-        </p:nvSpPr>
-        <p:spPr>
-          <a:xfrm>
-            <a:off x="249459" y="4730098"/>
-            <a:ext cx="3613600" cy="230832"/>
-          </a:xfrm>
-          <a:prstGeom prst="rect">
-            <a:avLst/>
-          </a:prstGeom>
-          <a:noFill/>
-        </p:spPr>
-        <p:txBody>
-          <a:bodyPr wrap="square" rtlCol="0" anchor="ctr">
-            <a:spAutoFit/>
-          </a:bodyPr>
-          <a:lstStyle/>
-          <a:p>
-            <a:r>
-              <a:rPr lang="en-US" sz="900" dirty="0">
-                <a:solidFill>
-                  <a:schemeClr val="bg1"/>
-                </a:solidFill>
-              </a:rPr>
-              <a:t>INDIANA UNIVERSITY BLOOMINGTON</a:t>
-            </a:r>
-          </a:p>
-        </p:txBody>
-      </p:sp>
       <p:pic>
         <p:nvPicPr>
           <p:cNvPr id="12" name="Picture 11">
@@ -3169,45 +3121,6 @@
           </a:p>
         </p:txBody>
       </p:sp>
-      <p:sp>
-        <p:nvSpPr>
-          <p:cNvPr id="15" name="TextBox 14">
-            <a:extLst>
-              <a:ext uri="{FF2B5EF4-FFF2-40B4-BE49-F238E27FC236}">
-                <a16:creationId xmlns:a16="http://schemas.microsoft.com/office/drawing/2014/main" id="{83C374B8-B479-4346-A54D-C9BCEB4872C2}"/>
-              </a:ext>
-            </a:extLst>
-          </p:cNvPr>
-          <p:cNvSpPr txBox="1"/>
-          <p:nvPr userDrawn="1"/>
-        </p:nvSpPr>
-        <p:spPr>
-          <a:xfrm>
-            <a:off x="249459" y="4730098"/>
-            <a:ext cx="3613600" cy="230832"/>
-          </a:xfrm>
-          <a:prstGeom prst="rect">
-            <a:avLst/>
-          </a:prstGeom>
-          <a:noFill/>
-        </p:spPr>
-        <p:txBody>
-          <a:bodyPr wrap="square" rtlCol="0" anchor="ctr">
-            <a:spAutoFit/>
-          </a:bodyPr>
-          <a:lstStyle/>
-          <a:p>
-            <a:r>
-              <a:rPr lang="en-US" sz="900" dirty="0">
-                <a:solidFill>
-                  <a:schemeClr val="bg1"/>
-                </a:solidFill>
-              </a:rPr>
-              <a:t>INDIANA UNIVERSITY BLOOMINGTON</a:t>
-            </a:r>
-          </a:p>
-        </p:txBody>
-      </p:sp>
       <p:pic>
         <p:nvPicPr>
           <p:cNvPr id="17" name="Picture 16">
@@ -3357,45 +3270,6 @@
               <a:t>Click icon to add picture</a:t>
             </a:r>
             <a:endParaRPr lang="en-US" dirty="0"/>
-          </a:p>
-        </p:txBody>
-      </p:sp>
-      <p:sp>
-        <p:nvSpPr>
-          <p:cNvPr id="9" name="TextBox 8">
-            <a:extLst>
-              <a:ext uri="{FF2B5EF4-FFF2-40B4-BE49-F238E27FC236}">
-                <a16:creationId xmlns:a16="http://schemas.microsoft.com/office/drawing/2014/main" id="{BDA01BD1-EDC8-654F-B0BC-CA7AEDB213DF}"/>
-              </a:ext>
-            </a:extLst>
-          </p:cNvPr>
-          <p:cNvSpPr txBox="1"/>
-          <p:nvPr userDrawn="1"/>
-        </p:nvSpPr>
-        <p:spPr>
-          <a:xfrm>
-            <a:off x="249459" y="4730098"/>
-            <a:ext cx="3613600" cy="230832"/>
-          </a:xfrm>
-          <a:prstGeom prst="rect">
-            <a:avLst/>
-          </a:prstGeom>
-          <a:noFill/>
-        </p:spPr>
-        <p:txBody>
-          <a:bodyPr wrap="square" rtlCol="0" anchor="ctr">
-            <a:spAutoFit/>
-          </a:bodyPr>
-          <a:lstStyle/>
-          <a:p>
-            <a:r>
-              <a:rPr lang="en-US" sz="900" dirty="0">
-                <a:solidFill>
-                  <a:schemeClr val="bg1"/>
-                </a:solidFill>
-              </a:rPr>
-              <a:t>INDIANA UNIVERSITY BLOOMINGTON</a:t>
-            </a:r>
           </a:p>
         </p:txBody>
       </p:sp>
@@ -4184,45 +4058,6 @@
           </a:p>
         </p:txBody>
       </p:sp>
-      <p:sp>
-        <p:nvSpPr>
-          <p:cNvPr id="8" name="TextBox 7">
-            <a:extLst>
-              <a:ext uri="{FF2B5EF4-FFF2-40B4-BE49-F238E27FC236}">
-                <a16:creationId xmlns:a16="http://schemas.microsoft.com/office/drawing/2014/main" id="{745FD385-09FF-4646-A2A1-16EC973C8B3E}"/>
-              </a:ext>
-            </a:extLst>
-          </p:cNvPr>
-          <p:cNvSpPr txBox="1"/>
-          <p:nvPr userDrawn="1"/>
-        </p:nvSpPr>
-        <p:spPr>
-          <a:xfrm>
-            <a:off x="249459" y="4730098"/>
-            <a:ext cx="3613600" cy="230832"/>
-          </a:xfrm>
-          <a:prstGeom prst="rect">
-            <a:avLst/>
-          </a:prstGeom>
-          <a:noFill/>
-        </p:spPr>
-        <p:txBody>
-          <a:bodyPr wrap="square" rtlCol="0" anchor="ctr">
-            <a:spAutoFit/>
-          </a:bodyPr>
-          <a:lstStyle/>
-          <a:p>
-            <a:r>
-              <a:rPr lang="en-US" sz="900" dirty="0">
-                <a:solidFill>
-                  <a:schemeClr val="tx1"/>
-                </a:solidFill>
-              </a:rPr>
-              <a:t>INDIANA UNIVERSITY BLOOMINGTON</a:t>
-            </a:r>
-          </a:p>
-        </p:txBody>
-      </p:sp>
       <p:pic>
         <p:nvPicPr>
           <p:cNvPr id="11" name="Picture 10">
@@ -4491,45 +4326,6 @@
           </a:p>
         </p:txBody>
       </p:sp>
-      <p:sp>
-        <p:nvSpPr>
-          <p:cNvPr id="12" name="TextBox 11">
-            <a:extLst>
-              <a:ext uri="{FF2B5EF4-FFF2-40B4-BE49-F238E27FC236}">
-                <a16:creationId xmlns:a16="http://schemas.microsoft.com/office/drawing/2014/main" id="{FE601522-F9F8-3B4D-B3C2-33C3574992E6}"/>
-              </a:ext>
-            </a:extLst>
-          </p:cNvPr>
-          <p:cNvSpPr txBox="1"/>
-          <p:nvPr userDrawn="1"/>
-        </p:nvSpPr>
-        <p:spPr>
-          <a:xfrm>
-            <a:off x="249459" y="4730098"/>
-            <a:ext cx="3613600" cy="230832"/>
-          </a:xfrm>
-          <a:prstGeom prst="rect">
-            <a:avLst/>
-          </a:prstGeom>
-          <a:noFill/>
-        </p:spPr>
-        <p:txBody>
-          <a:bodyPr wrap="square" rtlCol="0" anchor="ctr">
-            <a:spAutoFit/>
-          </a:bodyPr>
-          <a:lstStyle/>
-          <a:p>
-            <a:r>
-              <a:rPr lang="en-US" sz="900" dirty="0">
-                <a:solidFill>
-                  <a:schemeClr val="tx1"/>
-                </a:solidFill>
-              </a:rPr>
-              <a:t>INDIANA UNIVERSITY BLOOMINGTON</a:t>
-            </a:r>
-          </a:p>
-        </p:txBody>
-      </p:sp>
       <p:pic>
         <p:nvPicPr>
           <p:cNvPr id="13" name="Picture 12">
@@ -4811,45 +4607,6 @@
           </a:p>
         </p:txBody>
       </p:sp>
-      <p:sp>
-        <p:nvSpPr>
-          <p:cNvPr id="8" name="TextBox 7">
-            <a:extLst>
-              <a:ext uri="{FF2B5EF4-FFF2-40B4-BE49-F238E27FC236}">
-                <a16:creationId xmlns:a16="http://schemas.microsoft.com/office/drawing/2014/main" id="{BB691168-65FC-EA40-9C06-33BE34A593EA}"/>
-              </a:ext>
-            </a:extLst>
-          </p:cNvPr>
-          <p:cNvSpPr txBox="1"/>
-          <p:nvPr userDrawn="1"/>
-        </p:nvSpPr>
-        <p:spPr>
-          <a:xfrm>
-            <a:off x="249459" y="4730098"/>
-            <a:ext cx="3613600" cy="230832"/>
-          </a:xfrm>
-          <a:prstGeom prst="rect">
-            <a:avLst/>
-          </a:prstGeom>
-          <a:noFill/>
-        </p:spPr>
-        <p:txBody>
-          <a:bodyPr wrap="square" rtlCol="0" anchor="ctr">
-            <a:spAutoFit/>
-          </a:bodyPr>
-          <a:lstStyle/>
-          <a:p>
-            <a:r>
-              <a:rPr lang="en-US" sz="900" dirty="0">
-                <a:solidFill>
-                  <a:schemeClr val="tx1"/>
-                </a:solidFill>
-              </a:rPr>
-              <a:t>INDIANA UNIVERSITY BLOOMINGTON</a:t>
-            </a:r>
-          </a:p>
-        </p:txBody>
-      </p:sp>
       <p:pic>
         <p:nvPicPr>
           <p:cNvPr id="11" name="Picture 10">
@@ -5780,45 +5537,6 @@
           </a:p>
         </p:txBody>
       </p:sp>
-      <p:sp>
-        <p:nvSpPr>
-          <p:cNvPr id="15" name="TextBox 14">
-            <a:extLst>
-              <a:ext uri="{FF2B5EF4-FFF2-40B4-BE49-F238E27FC236}">
-                <a16:creationId xmlns:a16="http://schemas.microsoft.com/office/drawing/2014/main" id="{34146110-85CE-0345-97E0-49BF9C946C8C}"/>
-              </a:ext>
-            </a:extLst>
-          </p:cNvPr>
-          <p:cNvSpPr txBox="1"/>
-          <p:nvPr userDrawn="1"/>
-        </p:nvSpPr>
-        <p:spPr>
-          <a:xfrm>
-            <a:off x="249459" y="4730098"/>
-            <a:ext cx="3613600" cy="230832"/>
-          </a:xfrm>
-          <a:prstGeom prst="rect">
-            <a:avLst/>
-          </a:prstGeom>
-          <a:noFill/>
-        </p:spPr>
-        <p:txBody>
-          <a:bodyPr wrap="square" rtlCol="0" anchor="ctr">
-            <a:spAutoFit/>
-          </a:bodyPr>
-          <a:lstStyle/>
-          <a:p>
-            <a:r>
-              <a:rPr lang="en-US" sz="900" dirty="0">
-                <a:solidFill>
-                  <a:schemeClr val="tx1"/>
-                </a:solidFill>
-              </a:rPr>
-              <a:t>INDIANA UNIVERSITY BLOOMINGTON</a:t>
-            </a:r>
-          </a:p>
-        </p:txBody>
-      </p:sp>
       <p:pic>
         <p:nvPicPr>
           <p:cNvPr id="17" name="Picture 16">
@@ -5960,45 +5678,6 @@
               <a:t>Click icon to add picture</a:t>
             </a:r>
             <a:endParaRPr lang="en-US" dirty="0"/>
-          </a:p>
-        </p:txBody>
-      </p:sp>
-      <p:sp>
-        <p:nvSpPr>
-          <p:cNvPr id="8" name="TextBox 7">
-            <a:extLst>
-              <a:ext uri="{FF2B5EF4-FFF2-40B4-BE49-F238E27FC236}">
-                <a16:creationId xmlns:a16="http://schemas.microsoft.com/office/drawing/2014/main" id="{133C47D5-629F-4D46-AEE6-7D8DD8FB9AC3}"/>
-              </a:ext>
-            </a:extLst>
-          </p:cNvPr>
-          <p:cNvSpPr txBox="1"/>
-          <p:nvPr userDrawn="1"/>
-        </p:nvSpPr>
-        <p:spPr>
-          <a:xfrm>
-            <a:off x="249459" y="4730098"/>
-            <a:ext cx="3613600" cy="230832"/>
-          </a:xfrm>
-          <a:prstGeom prst="rect">
-            <a:avLst/>
-          </a:prstGeom>
-          <a:noFill/>
-        </p:spPr>
-        <p:txBody>
-          <a:bodyPr wrap="square" rtlCol="0" anchor="ctr">
-            <a:spAutoFit/>
-          </a:bodyPr>
-          <a:lstStyle/>
-          <a:p>
-            <a:r>
-              <a:rPr lang="en-US" sz="900" dirty="0">
-                <a:solidFill>
-                  <a:schemeClr val="tx1"/>
-                </a:solidFill>
-              </a:rPr>
-              <a:t>INDIANA UNIVERSITY BLOOMINGTON</a:t>
-            </a:r>
           </a:p>
         </p:txBody>
       </p:sp>
@@ -6280,45 +5959,6 @@
             <a:r>
               <a:rPr lang="en-US" dirty="0"/>
               <a:t>Click to edit master subtitle style</a:t>
-            </a:r>
-          </a:p>
-        </p:txBody>
-      </p:sp>
-      <p:sp>
-        <p:nvSpPr>
-          <p:cNvPr id="8" name="TextBox 7">
-            <a:extLst>
-              <a:ext uri="{FF2B5EF4-FFF2-40B4-BE49-F238E27FC236}">
-                <a16:creationId xmlns:a16="http://schemas.microsoft.com/office/drawing/2014/main" id="{0A0E35C7-389A-8446-833E-F0D534DB2632}"/>
-              </a:ext>
-            </a:extLst>
-          </p:cNvPr>
-          <p:cNvSpPr txBox="1"/>
-          <p:nvPr userDrawn="1"/>
-        </p:nvSpPr>
-        <p:spPr>
-          <a:xfrm>
-            <a:off x="249459" y="4730098"/>
-            <a:ext cx="3613600" cy="230832"/>
-          </a:xfrm>
-          <a:prstGeom prst="rect">
-            <a:avLst/>
-          </a:prstGeom>
-          <a:noFill/>
-        </p:spPr>
-        <p:txBody>
-          <a:bodyPr wrap="square" rtlCol="0" anchor="ctr">
-            <a:spAutoFit/>
-          </a:bodyPr>
-          <a:lstStyle/>
-          <a:p>
-            <a:r>
-              <a:rPr lang="en-US" sz="900" dirty="0">
-                <a:solidFill>
-                  <a:schemeClr val="bg1"/>
-                </a:solidFill>
-              </a:rPr>
-              <a:t>INDIANA UNIVERSITY BLOOMINGTON</a:t>
             </a:r>
           </a:p>
         </p:txBody>
@@ -6871,6 +6511,436 @@
           </a:p>
         </p:txBody>
       </p:sp>
+      <p:sp>
+        <p:nvSpPr>
+          <p:cNvPr id="4" name="Text Placeholder 10">
+            <a:extLst>
+              <a:ext uri="{FF2B5EF4-FFF2-40B4-BE49-F238E27FC236}">
+                <a16:creationId xmlns:a16="http://schemas.microsoft.com/office/drawing/2014/main" id="{1813DA81-6AFA-1541-A665-5CE4EA30D2F2}"/>
+              </a:ext>
+            </a:extLst>
+          </p:cNvPr>
+          <p:cNvSpPr txBox="1">
+            <a:spLocks/>
+          </p:cNvSpPr>
+          <p:nvPr/>
+        </p:nvSpPr>
+        <p:spPr>
+          <a:xfrm>
+            <a:off x="530694" y="3952954"/>
+            <a:ext cx="7734222" cy="252412"/>
+          </a:xfrm>
+          <a:prstGeom prst="rect">
+            <a:avLst/>
+          </a:prstGeom>
+        </p:spPr>
+        <p:txBody>
+          <a:bodyPr vert="horz" lIns="91440" tIns="45720" rIns="91440" bIns="45720" rtlCol="0" anchor="ctr">
+            <a:noAutofit/>
+          </a:bodyPr>
+          <a:lstStyle>
+            <a:lvl1pPr marL="0" indent="0" algn="l" defTabSz="457200" rtl="0" eaLnBrk="1" latinLnBrk="0" hangingPunct="1">
+              <a:lnSpc>
+                <a:spcPct val="100000"/>
+              </a:lnSpc>
+              <a:spcBef>
+                <a:spcPts val="0"/>
+              </a:spcBef>
+              <a:spcAft>
+                <a:spcPts val="1800"/>
+              </a:spcAft>
+              <a:buClr>
+                <a:schemeClr val="tx1">
+                  <a:lumMod val="50000"/>
+                  <a:lumOff val="50000"/>
+                </a:schemeClr>
+              </a:buClr>
+              <a:buSzPct val="100000"/>
+              <a:buFont typeface="Wingdings" charset="2"/>
+              <a:buNone/>
+              <a:defRPr sz="1800" b="0" kern="1200" spc="0" baseline="0">
+                <a:solidFill>
+                  <a:srgbClr val="A6A6A6"/>
+                </a:solidFill>
+                <a:latin typeface="Arial"/>
+                <a:ea typeface="+mn-ea"/>
+                <a:cs typeface="Arial"/>
+              </a:defRPr>
+            </a:lvl1pPr>
+            <a:lvl2pPr marL="742950" indent="-285750" algn="l" defTabSz="457200" rtl="0" eaLnBrk="1" latinLnBrk="0" hangingPunct="1">
+              <a:lnSpc>
+                <a:spcPct val="100000"/>
+              </a:lnSpc>
+              <a:spcBef>
+                <a:spcPts val="0"/>
+              </a:spcBef>
+              <a:spcAft>
+                <a:spcPts val="1800"/>
+              </a:spcAft>
+              <a:buFont typeface="Arial"/>
+              <a:buChar char="–"/>
+              <a:defRPr sz="1800" kern="1200">
+                <a:solidFill>
+                  <a:schemeClr val="tx1"/>
+                </a:solidFill>
+                <a:latin typeface="Arial"/>
+                <a:ea typeface="+mn-ea"/>
+                <a:cs typeface="Arial"/>
+              </a:defRPr>
+            </a:lvl2pPr>
+            <a:lvl3pPr marL="1143000" indent="-228600" algn="l" defTabSz="457200" rtl="0" eaLnBrk="1" latinLnBrk="0" hangingPunct="1">
+              <a:lnSpc>
+                <a:spcPct val="100000"/>
+              </a:lnSpc>
+              <a:spcBef>
+                <a:spcPts val="0"/>
+              </a:spcBef>
+              <a:spcAft>
+                <a:spcPts val="1800"/>
+              </a:spcAft>
+              <a:buFont typeface="Arial"/>
+              <a:buChar char="•"/>
+              <a:defRPr sz="1800" kern="1200">
+                <a:solidFill>
+                  <a:schemeClr val="tx1"/>
+                </a:solidFill>
+                <a:latin typeface="Arial"/>
+                <a:ea typeface="+mn-ea"/>
+                <a:cs typeface="Arial"/>
+              </a:defRPr>
+            </a:lvl3pPr>
+            <a:lvl4pPr marL="1600200" indent="-228600" algn="l" defTabSz="457200" rtl="0" eaLnBrk="1" latinLnBrk="0" hangingPunct="1">
+              <a:lnSpc>
+                <a:spcPct val="100000"/>
+              </a:lnSpc>
+              <a:spcBef>
+                <a:spcPts val="0"/>
+              </a:spcBef>
+              <a:spcAft>
+                <a:spcPts val="1800"/>
+              </a:spcAft>
+              <a:buFont typeface="Arial"/>
+              <a:buChar char="–"/>
+              <a:defRPr sz="1800" kern="1200">
+                <a:solidFill>
+                  <a:schemeClr val="tx1"/>
+                </a:solidFill>
+                <a:latin typeface="Arial"/>
+                <a:ea typeface="+mn-ea"/>
+                <a:cs typeface="Arial"/>
+              </a:defRPr>
+            </a:lvl4pPr>
+            <a:lvl5pPr marL="2057400" indent="-228600" algn="l" defTabSz="457200" rtl="0" eaLnBrk="1" latinLnBrk="0" hangingPunct="1">
+              <a:lnSpc>
+                <a:spcPct val="100000"/>
+              </a:lnSpc>
+              <a:spcBef>
+                <a:spcPts val="0"/>
+              </a:spcBef>
+              <a:spcAft>
+                <a:spcPts val="1800"/>
+              </a:spcAft>
+              <a:buFont typeface="Arial"/>
+              <a:buChar char="»"/>
+              <a:defRPr sz="1800" kern="1200">
+                <a:solidFill>
+                  <a:schemeClr val="tx1"/>
+                </a:solidFill>
+                <a:latin typeface="Arial"/>
+                <a:ea typeface="+mn-ea"/>
+                <a:cs typeface="Arial"/>
+              </a:defRPr>
+            </a:lvl5pPr>
+            <a:lvl6pPr marL="2514600" indent="-228600" algn="l" defTabSz="457200" rtl="0" eaLnBrk="1" latinLnBrk="0" hangingPunct="1">
+              <a:spcBef>
+                <a:spcPct val="20000"/>
+              </a:spcBef>
+              <a:buFont typeface="Arial"/>
+              <a:buChar char="•"/>
+              <a:defRPr sz="2000" kern="1200">
+                <a:solidFill>
+                  <a:schemeClr val="tx1"/>
+                </a:solidFill>
+                <a:latin typeface="+mn-lt"/>
+                <a:ea typeface="+mn-ea"/>
+                <a:cs typeface="+mn-cs"/>
+              </a:defRPr>
+            </a:lvl6pPr>
+            <a:lvl7pPr marL="2971800" indent="-228600" algn="l" defTabSz="457200" rtl="0" eaLnBrk="1" latinLnBrk="0" hangingPunct="1">
+              <a:spcBef>
+                <a:spcPct val="20000"/>
+              </a:spcBef>
+              <a:buFont typeface="Arial"/>
+              <a:buChar char="•"/>
+              <a:defRPr sz="2000" kern="1200">
+                <a:solidFill>
+                  <a:schemeClr val="tx1"/>
+                </a:solidFill>
+                <a:latin typeface="+mn-lt"/>
+                <a:ea typeface="+mn-ea"/>
+                <a:cs typeface="+mn-cs"/>
+              </a:defRPr>
+            </a:lvl7pPr>
+            <a:lvl8pPr marL="3429000" indent="-228600" algn="l" defTabSz="457200" rtl="0" eaLnBrk="1" latinLnBrk="0" hangingPunct="1">
+              <a:spcBef>
+                <a:spcPct val="20000"/>
+              </a:spcBef>
+              <a:buFont typeface="Arial"/>
+              <a:buChar char="•"/>
+              <a:defRPr sz="2000" kern="1200">
+                <a:solidFill>
+                  <a:schemeClr val="tx1"/>
+                </a:solidFill>
+                <a:latin typeface="+mn-lt"/>
+                <a:ea typeface="+mn-ea"/>
+                <a:cs typeface="+mn-cs"/>
+              </a:defRPr>
+            </a:lvl8pPr>
+            <a:lvl9pPr marL="3886200" indent="-228600" algn="l" defTabSz="457200" rtl="0" eaLnBrk="1" latinLnBrk="0" hangingPunct="1">
+              <a:spcBef>
+                <a:spcPct val="20000"/>
+              </a:spcBef>
+              <a:buFont typeface="Arial"/>
+              <a:buChar char="•"/>
+              <a:defRPr sz="2000" kern="1200">
+                <a:solidFill>
+                  <a:schemeClr val="tx1"/>
+                </a:solidFill>
+                <a:latin typeface="+mn-lt"/>
+                <a:ea typeface="+mn-ea"/>
+                <a:cs typeface="+mn-cs"/>
+              </a:defRPr>
+            </a:lvl9pPr>
+          </a:lstStyle>
+          <a:p>
+            <a:r>
+              <a:rPr lang="en-US" dirty="0">
+                <a:solidFill>
+                  <a:schemeClr val="bg1"/>
+                </a:solidFill>
+              </a:rPr>
+              <a:t>By: Ankit Mathur &amp; Nitesh Jaswal</a:t>
+            </a:r>
+          </a:p>
+        </p:txBody>
+      </p:sp>
+      <p:sp>
+        <p:nvSpPr>
+          <p:cNvPr id="5" name="Text Placeholder 10">
+            <a:extLst>
+              <a:ext uri="{FF2B5EF4-FFF2-40B4-BE49-F238E27FC236}">
+                <a16:creationId xmlns:a16="http://schemas.microsoft.com/office/drawing/2014/main" id="{12F53BD8-00D0-CB46-A667-2202A80CD492}"/>
+              </a:ext>
+            </a:extLst>
+          </p:cNvPr>
+          <p:cNvSpPr txBox="1">
+            <a:spLocks/>
+          </p:cNvSpPr>
+          <p:nvPr/>
+        </p:nvSpPr>
+        <p:spPr>
+          <a:xfrm>
+            <a:off x="536771" y="4275618"/>
+            <a:ext cx="7734222" cy="252412"/>
+          </a:xfrm>
+          <a:prstGeom prst="rect">
+            <a:avLst/>
+          </a:prstGeom>
+        </p:spPr>
+        <p:txBody>
+          <a:bodyPr vert="horz" lIns="91440" tIns="45720" rIns="91440" bIns="45720" rtlCol="0" anchor="ctr">
+            <a:noAutofit/>
+          </a:bodyPr>
+          <a:lstStyle>
+            <a:lvl1pPr marL="0" indent="0" algn="l" defTabSz="457200" rtl="0" eaLnBrk="1" latinLnBrk="0" hangingPunct="1">
+              <a:lnSpc>
+                <a:spcPct val="100000"/>
+              </a:lnSpc>
+              <a:spcBef>
+                <a:spcPts val="0"/>
+              </a:spcBef>
+              <a:spcAft>
+                <a:spcPts val="1800"/>
+              </a:spcAft>
+              <a:buClr>
+                <a:schemeClr val="tx1">
+                  <a:lumMod val="50000"/>
+                  <a:lumOff val="50000"/>
+                </a:schemeClr>
+              </a:buClr>
+              <a:buSzPct val="100000"/>
+              <a:buFont typeface="Wingdings" charset="2"/>
+              <a:buNone/>
+              <a:defRPr sz="1800" b="0" kern="1200" spc="0" baseline="0">
+                <a:solidFill>
+                  <a:srgbClr val="A6A6A6"/>
+                </a:solidFill>
+                <a:latin typeface="Arial"/>
+                <a:ea typeface="+mn-ea"/>
+                <a:cs typeface="Arial"/>
+              </a:defRPr>
+            </a:lvl1pPr>
+            <a:lvl2pPr marL="742950" indent="-285750" algn="l" defTabSz="457200" rtl="0" eaLnBrk="1" latinLnBrk="0" hangingPunct="1">
+              <a:lnSpc>
+                <a:spcPct val="100000"/>
+              </a:lnSpc>
+              <a:spcBef>
+                <a:spcPts val="0"/>
+              </a:spcBef>
+              <a:spcAft>
+                <a:spcPts val="1800"/>
+              </a:spcAft>
+              <a:buFont typeface="Arial"/>
+              <a:buChar char="–"/>
+              <a:defRPr sz="1800" kern="1200">
+                <a:solidFill>
+                  <a:schemeClr val="tx1"/>
+                </a:solidFill>
+                <a:latin typeface="Arial"/>
+                <a:ea typeface="+mn-ea"/>
+                <a:cs typeface="Arial"/>
+              </a:defRPr>
+            </a:lvl2pPr>
+            <a:lvl3pPr marL="1143000" indent="-228600" algn="l" defTabSz="457200" rtl="0" eaLnBrk="1" latinLnBrk="0" hangingPunct="1">
+              <a:lnSpc>
+                <a:spcPct val="100000"/>
+              </a:lnSpc>
+              <a:spcBef>
+                <a:spcPts val="0"/>
+              </a:spcBef>
+              <a:spcAft>
+                <a:spcPts val="1800"/>
+              </a:spcAft>
+              <a:buFont typeface="Arial"/>
+              <a:buChar char="•"/>
+              <a:defRPr sz="1800" kern="1200">
+                <a:solidFill>
+                  <a:schemeClr val="tx1"/>
+                </a:solidFill>
+                <a:latin typeface="Arial"/>
+                <a:ea typeface="+mn-ea"/>
+                <a:cs typeface="Arial"/>
+              </a:defRPr>
+            </a:lvl3pPr>
+            <a:lvl4pPr marL="1600200" indent="-228600" algn="l" defTabSz="457200" rtl="0" eaLnBrk="1" latinLnBrk="0" hangingPunct="1">
+              <a:lnSpc>
+                <a:spcPct val="100000"/>
+              </a:lnSpc>
+              <a:spcBef>
+                <a:spcPts val="0"/>
+              </a:spcBef>
+              <a:spcAft>
+                <a:spcPts val="1800"/>
+              </a:spcAft>
+              <a:buFont typeface="Arial"/>
+              <a:buChar char="–"/>
+              <a:defRPr sz="1800" kern="1200">
+                <a:solidFill>
+                  <a:schemeClr val="tx1"/>
+                </a:solidFill>
+                <a:latin typeface="Arial"/>
+                <a:ea typeface="+mn-ea"/>
+                <a:cs typeface="Arial"/>
+              </a:defRPr>
+            </a:lvl4pPr>
+            <a:lvl5pPr marL="2057400" indent="-228600" algn="l" defTabSz="457200" rtl="0" eaLnBrk="1" latinLnBrk="0" hangingPunct="1">
+              <a:lnSpc>
+                <a:spcPct val="100000"/>
+              </a:lnSpc>
+              <a:spcBef>
+                <a:spcPts val="0"/>
+              </a:spcBef>
+              <a:spcAft>
+                <a:spcPts val="1800"/>
+              </a:spcAft>
+              <a:buFont typeface="Arial"/>
+              <a:buChar char="»"/>
+              <a:defRPr sz="1800" kern="1200">
+                <a:solidFill>
+                  <a:schemeClr val="tx1"/>
+                </a:solidFill>
+                <a:latin typeface="Arial"/>
+                <a:ea typeface="+mn-ea"/>
+                <a:cs typeface="Arial"/>
+              </a:defRPr>
+            </a:lvl5pPr>
+            <a:lvl6pPr marL="2514600" indent="-228600" algn="l" defTabSz="457200" rtl="0" eaLnBrk="1" latinLnBrk="0" hangingPunct="1">
+              <a:spcBef>
+                <a:spcPct val="20000"/>
+              </a:spcBef>
+              <a:buFont typeface="Arial"/>
+              <a:buChar char="•"/>
+              <a:defRPr sz="2000" kern="1200">
+                <a:solidFill>
+                  <a:schemeClr val="tx1"/>
+                </a:solidFill>
+                <a:latin typeface="+mn-lt"/>
+                <a:ea typeface="+mn-ea"/>
+                <a:cs typeface="+mn-cs"/>
+              </a:defRPr>
+            </a:lvl6pPr>
+            <a:lvl7pPr marL="2971800" indent="-228600" algn="l" defTabSz="457200" rtl="0" eaLnBrk="1" latinLnBrk="0" hangingPunct="1">
+              <a:spcBef>
+                <a:spcPct val="20000"/>
+              </a:spcBef>
+              <a:buFont typeface="Arial"/>
+              <a:buChar char="•"/>
+              <a:defRPr sz="2000" kern="1200">
+                <a:solidFill>
+                  <a:schemeClr val="tx1"/>
+                </a:solidFill>
+                <a:latin typeface="+mn-lt"/>
+                <a:ea typeface="+mn-ea"/>
+                <a:cs typeface="+mn-cs"/>
+              </a:defRPr>
+            </a:lvl7pPr>
+            <a:lvl8pPr marL="3429000" indent="-228600" algn="l" defTabSz="457200" rtl="0" eaLnBrk="1" latinLnBrk="0" hangingPunct="1">
+              <a:spcBef>
+                <a:spcPct val="20000"/>
+              </a:spcBef>
+              <a:buFont typeface="Arial"/>
+              <a:buChar char="•"/>
+              <a:defRPr sz="2000" kern="1200">
+                <a:solidFill>
+                  <a:schemeClr val="tx1"/>
+                </a:solidFill>
+                <a:latin typeface="+mn-lt"/>
+                <a:ea typeface="+mn-ea"/>
+                <a:cs typeface="+mn-cs"/>
+              </a:defRPr>
+            </a:lvl8pPr>
+            <a:lvl9pPr marL="3886200" indent="-228600" algn="l" defTabSz="457200" rtl="0" eaLnBrk="1" latinLnBrk="0" hangingPunct="1">
+              <a:spcBef>
+                <a:spcPct val="20000"/>
+              </a:spcBef>
+              <a:buFont typeface="Arial"/>
+              <a:buChar char="•"/>
+              <a:defRPr sz="2000" kern="1200">
+                <a:solidFill>
+                  <a:schemeClr val="tx1"/>
+                </a:solidFill>
+                <a:latin typeface="+mn-lt"/>
+                <a:ea typeface="+mn-ea"/>
+                <a:cs typeface="+mn-cs"/>
+              </a:defRPr>
+            </a:lvl9pPr>
+          </a:lstStyle>
+          <a:p>
+            <a:r>
+              <a:rPr lang="en-US" sz="1400" dirty="0"/>
+              <a:t>April 16</a:t>
+            </a:r>
+            <a:r>
+              <a:rPr lang="en-US" sz="1400" baseline="30000" dirty="0"/>
+              <a:t>th</a:t>
+            </a:r>
+            <a:r>
+              <a:rPr lang="en-US" sz="1400" dirty="0"/>
+              <a:t>, 2019</a:t>
+            </a:r>
+          </a:p>
+        </p:txBody>
+      </p:sp>
     </p:spTree>
     <p:extLst>
       <p:ext uri="{BB962C8B-B14F-4D97-AF65-F5344CB8AC3E}">
@@ -8324,10 +8394,10 @@
       </p:grpSpPr>
       <p:pic>
         <p:nvPicPr>
-          <p:cNvPr id="15" name="Picture 14">
+          <p:cNvPr id="17" name="Picture 16">
             <a:extLst>
               <a:ext uri="{FF2B5EF4-FFF2-40B4-BE49-F238E27FC236}">
-                <a16:creationId xmlns:a16="http://schemas.microsoft.com/office/drawing/2014/main" id="{9F07A571-AC63-2048-B653-9A0081AA3734}"/>
+                <a16:creationId xmlns:a16="http://schemas.microsoft.com/office/drawing/2014/main" id="{8829A717-1A61-084D-AB41-F0375938A75E}"/>
               </a:ext>
             </a:extLst>
           </p:cNvPr>
@@ -8338,13 +8408,71 @@
         </p:nvPicPr>
         <p:blipFill rotWithShape="1">
           <a:blip r:embed="rId3"/>
-          <a:srcRect b="5578"/>
+          <a:srcRect b="5246"/>
           <a:stretch/>
         </p:blipFill>
         <p:spPr>
           <a:xfrm>
-            <a:off x="127494" y="786985"/>
-            <a:ext cx="3470145" cy="2022116"/>
+            <a:off x="517996" y="753533"/>
+            <a:ext cx="3613738" cy="2113211"/>
+          </a:xfrm>
+          <a:prstGeom prst="rect">
+            <a:avLst/>
+          </a:prstGeom>
+        </p:spPr>
+      </p:pic>
+      <p:pic>
+        <p:nvPicPr>
+          <p:cNvPr id="18" name="Picture 17">
+            <a:extLst>
+              <a:ext uri="{FF2B5EF4-FFF2-40B4-BE49-F238E27FC236}">
+                <a16:creationId xmlns:a16="http://schemas.microsoft.com/office/drawing/2014/main" id="{2F19BB8B-652D-684A-B522-766B0E4EC8F1}"/>
+              </a:ext>
+            </a:extLst>
+          </p:cNvPr>
+          <p:cNvPicPr>
+            <a:picLocks noChangeAspect="1"/>
+          </p:cNvPicPr>
+          <p:nvPr/>
+        </p:nvPicPr>
+        <p:blipFill rotWithShape="1">
+          <a:blip r:embed="rId4"/>
+          <a:srcRect b="4655"/>
+          <a:stretch/>
+        </p:blipFill>
+        <p:spPr>
+          <a:xfrm>
+            <a:off x="4722814" y="753533"/>
+            <a:ext cx="3613738" cy="2126387"/>
+          </a:xfrm>
+          <a:prstGeom prst="rect">
+            <a:avLst/>
+          </a:prstGeom>
+        </p:spPr>
+      </p:pic>
+      <p:pic>
+        <p:nvPicPr>
+          <p:cNvPr id="20" name="Picture 19">
+            <a:extLst>
+              <a:ext uri="{FF2B5EF4-FFF2-40B4-BE49-F238E27FC236}">
+                <a16:creationId xmlns:a16="http://schemas.microsoft.com/office/drawing/2014/main" id="{52A7AB00-C24D-C94D-ABDD-6047E3638A2D}"/>
+              </a:ext>
+            </a:extLst>
+          </p:cNvPr>
+          <p:cNvPicPr>
+            <a:picLocks noChangeAspect="1"/>
+          </p:cNvPicPr>
+          <p:nvPr/>
+        </p:nvPicPr>
+        <p:blipFill rotWithShape="1">
+          <a:blip r:embed="rId5"/>
+          <a:srcRect b="6337"/>
+          <a:stretch/>
+        </p:blipFill>
+        <p:spPr>
+          <a:xfrm>
+            <a:off x="475861" y="2941391"/>
+            <a:ext cx="3655874" cy="2113211"/>
           </a:xfrm>
           <a:prstGeom prst="rect">
             <a:avLst/>

</xml_diff>